<commit_message>
change links in index.html
</commit_message>
<xml_diff>
--- a/Sprint 1.pptx
+++ b/Sprint 1.pptx
@@ -266,6 +266,11 @@
       </a:defRPr>
     </a:lvl9pPr>
   </p:defaultTextStyle>
+  <p:extLst>
+    <p:ext uri="{EFAFB233-063F-42B5-8137-9DF3F51BA10A}">
+      <p15:sldGuideLst xmlns:p15="http://schemas.microsoft.com/office/powerpoint/2012/main"/>
+    </p:ext>
+  </p:extLst>
 </p:presentation>
 </file>
 
@@ -22690,7 +22695,10 @@
               <a:buAutoNum type="arabicPeriod"/>
             </a:pPr>
             <a:r>
-              <a:rPr lang="en-US" sz="2000">
+              <a:rPr lang="en-US" sz="2000" dirty="0">
+                <a:highlight>
+                  <a:srgbClr val="FFFF00"/>
+                </a:highlight>
                 <a:latin typeface="Arial"/>
                 <a:ea typeface="Arial"/>
                 <a:cs typeface="Arial"/>
@@ -22699,14 +22707,14 @@
               <a:t>Get familiar with Bootstrap</a:t>
             </a:r>
             <a:br>
-              <a:rPr lang="en-US" sz="2000">
+              <a:rPr lang="en-US" sz="2000" dirty="0">
                 <a:latin typeface="Arial"/>
                 <a:ea typeface="Arial"/>
                 <a:cs typeface="Arial"/>
                 <a:sym typeface="Arial"/>
               </a:rPr>
             </a:br>
-            <a:endParaRPr sz="2000">
+            <a:endParaRPr sz="2000" dirty="0">
               <a:latin typeface="Arial"/>
               <a:ea typeface="Arial"/>
               <a:cs typeface="Arial"/>
@@ -22732,7 +22740,10 @@
               <a:buAutoNum type="arabicPeriod"/>
             </a:pPr>
             <a:r>
-              <a:rPr lang="en-US" sz="2000">
+              <a:rPr lang="en-US" sz="2000" dirty="0">
+                <a:highlight>
+                  <a:srgbClr val="FFFF00"/>
+                </a:highlight>
                 <a:latin typeface="Arial"/>
                 <a:ea typeface="Arial"/>
                 <a:cs typeface="Arial"/>
@@ -22740,7 +22751,10 @@
               </a:rPr>
               <a:t>Create a basic template using the Bootstrap starter template.</a:t>
             </a:r>
-            <a:endParaRPr sz="2000">
+            <a:endParaRPr sz="2000" dirty="0">
+              <a:highlight>
+                <a:srgbClr val="FFFF00"/>
+              </a:highlight>
               <a:latin typeface="Arial"/>
               <a:ea typeface="Arial"/>
               <a:cs typeface="Arial"/>
@@ -22766,7 +22780,10 @@
               <a:buAutoNum type="arabicPeriod"/>
             </a:pPr>
             <a:r>
-              <a:rPr lang="en-US" sz="2000">
+              <a:rPr lang="en-US" sz="2000" dirty="0">
+                <a:highlight>
+                  <a:srgbClr val="FFFF00"/>
+                </a:highlight>
                 <a:latin typeface="Arial"/>
                 <a:ea typeface="Arial"/>
                 <a:cs typeface="Arial"/>
@@ -22775,14 +22792,14 @@
               <a:t>Create a form for Adding a new task.</a:t>
             </a:r>
             <a:br>
-              <a:rPr lang="en-US" sz="2000">
+              <a:rPr lang="en-US" sz="2000" dirty="0">
                 <a:latin typeface="Arial"/>
                 <a:ea typeface="Arial"/>
                 <a:cs typeface="Arial"/>
                 <a:sym typeface="Arial"/>
               </a:rPr>
             </a:br>
-            <a:endParaRPr sz="2000"/>
+            <a:endParaRPr sz="2000" dirty="0"/>
           </a:p>
         </p:txBody>
       </p:sp>
@@ -22994,7 +23011,7 @@
               </a:spcAft>
               <a:buNone/>
             </a:pPr>
-            <a:endParaRPr sz="2000">
+            <a:endParaRPr sz="2000" dirty="0">
               <a:latin typeface="Arial"/>
               <a:ea typeface="Arial"/>
               <a:cs typeface="Arial"/>
@@ -23016,10 +23033,18 @@
               <a:buChar char="▪"/>
             </a:pPr>
             <a:r>
-              <a:rPr lang="en-US" sz="2500"/>
+              <a:rPr lang="en-US" sz="2500" dirty="0">
+                <a:highlight>
+                  <a:srgbClr val="FFFF00"/>
+                </a:highlight>
+              </a:rPr>
               <a:t>In your index.html, create an "Add Task" button using Bootstrap buttons</a:t>
             </a:r>
-            <a:endParaRPr sz="2500"/>
+            <a:endParaRPr sz="2500" dirty="0">
+              <a:highlight>
+                <a:srgbClr val="FFFF00"/>
+              </a:highlight>
+            </a:endParaRPr>
           </a:p>
           <a:p>
             <a:pPr marL="457200" lvl="0" indent="-387350" algn="l" rtl="0">
@@ -23036,10 +23061,34 @@
               <a:buChar char="▪"/>
             </a:pPr>
             <a:r>
-              <a:rPr lang="en-US" sz="2500"/>
-              <a:t>The "Add Task" button should link to open up an "Add Task form." Use Bootstrap Modals and Bootstrap Forms to achieve this.</a:t>
+              <a:rPr lang="en-US" sz="2500" dirty="0">
+                <a:highlight>
+                  <a:srgbClr val="FFFF00"/>
+                </a:highlight>
+              </a:rPr>
+              <a:t>The "Add Task" button should link to open up an "Add Task form." </a:t>
             </a:r>
-            <a:endParaRPr sz="2500"/>
+            <a:r>
+              <a:rPr lang="en-US" sz="2500" dirty="0">
+                <a:highlight>
+                  <a:srgbClr val="FF0000"/>
+                </a:highlight>
+              </a:rPr>
+              <a:t>Use Bootstrap Modals </a:t>
+            </a:r>
+            <a:r>
+              <a:rPr lang="en-US" sz="2500" dirty="0">
+                <a:highlight>
+                  <a:srgbClr val="FFFF00"/>
+                </a:highlight>
+              </a:rPr>
+              <a:t>and Bootstrap Forms to achieve this.</a:t>
+            </a:r>
+            <a:endParaRPr sz="2500" dirty="0">
+              <a:highlight>
+                <a:srgbClr val="FFFF00"/>
+              </a:highlight>
+            </a:endParaRPr>
           </a:p>
           <a:p>
             <a:pPr marL="457200" lvl="0" indent="-387350" algn="l" rtl="0">
@@ -23056,10 +23105,18 @@
               <a:buChar char="▪"/>
             </a:pPr>
             <a:r>
-              <a:rPr lang="en-US" sz="2500"/>
+              <a:rPr lang="en-US" sz="2500" dirty="0">
+                <a:highlight>
+                  <a:srgbClr val="FFFF00"/>
+                </a:highlight>
+              </a:rPr>
               <a:t>Create a layout similar to your mock designs using HTML and Bootstrap components</a:t>
             </a:r>
-            <a:endParaRPr sz="2500"/>
+            <a:endParaRPr sz="2500" dirty="0">
+              <a:highlight>
+                <a:srgbClr val="FFFF00"/>
+              </a:highlight>
+            </a:endParaRPr>
           </a:p>
         </p:txBody>
       </p:sp>
@@ -23273,10 +23330,18 @@
               <a:buChar char="▪"/>
             </a:pPr>
             <a:r>
-              <a:rPr lang="en-US" sz="2500"/>
+              <a:rPr lang="en-US" sz="2500" dirty="0">
+                <a:highlight>
+                  <a:srgbClr val="FFFF00"/>
+                </a:highlight>
+              </a:rPr>
               <a:t>Verify that your "Add form" has the following elements</a:t>
             </a:r>
-            <a:endParaRPr sz="2500"/>
+            <a:endParaRPr sz="2500" dirty="0">
+              <a:highlight>
+                <a:srgbClr val="FFFF00"/>
+              </a:highlight>
+            </a:endParaRPr>
           </a:p>
           <a:p>
             <a:pPr marL="1371600" lvl="2" indent="-355600" algn="l" rtl="0">
@@ -23293,10 +23358,18 @@
               <a:buAutoNum type="romanLcPeriod"/>
             </a:pPr>
             <a:r>
-              <a:rPr lang="en-US" sz="2000"/>
+              <a:rPr lang="en-US" sz="2000" dirty="0">
+                <a:highlight>
+                  <a:srgbClr val="FFFF00"/>
+                </a:highlight>
+              </a:rPr>
               <a:t>'Add Task' heading</a:t>
             </a:r>
-            <a:endParaRPr sz="2000"/>
+            <a:endParaRPr sz="2000" dirty="0">
+              <a:highlight>
+                <a:srgbClr val="FFFF00"/>
+              </a:highlight>
+            </a:endParaRPr>
           </a:p>
           <a:p>
             <a:pPr marL="1371600" lvl="2" indent="-355600" algn="l" rtl="0">
@@ -23313,10 +23386,18 @@
               <a:buAutoNum type="romanLcPeriod"/>
             </a:pPr>
             <a:r>
-              <a:rPr lang="en-US" sz="2000"/>
+              <a:rPr lang="en-US" sz="2000" dirty="0">
+                <a:highlight>
+                  <a:srgbClr val="FFFF00"/>
+                </a:highlight>
+              </a:rPr>
               <a:t>Name -&gt; textbox</a:t>
             </a:r>
-            <a:endParaRPr sz="2000"/>
+            <a:endParaRPr sz="2000" dirty="0">
+              <a:highlight>
+                <a:srgbClr val="FFFF00"/>
+              </a:highlight>
+            </a:endParaRPr>
           </a:p>
           <a:p>
             <a:pPr marL="1371600" lvl="2" indent="-355600" algn="l" rtl="0">
@@ -23333,10 +23414,26 @@
               <a:buAutoNum type="romanLcPeriod"/>
             </a:pPr>
             <a:r>
-              <a:rPr lang="en-US" sz="2000"/>
-              <a:t>Description -&gt; textarea</a:t>
+              <a:rPr lang="en-US" sz="2000" dirty="0">
+                <a:highlight>
+                  <a:srgbClr val="FFFF00"/>
+                </a:highlight>
+              </a:rPr>
+              <a:t>Description -&gt; </a:t>
             </a:r>
-            <a:endParaRPr sz="2000"/>
+            <a:r>
+              <a:rPr lang="en-US" sz="2000" dirty="0" err="1">
+                <a:highlight>
+                  <a:srgbClr val="FFFF00"/>
+                </a:highlight>
+              </a:rPr>
+              <a:t>textarea</a:t>
+            </a:r>
+            <a:endParaRPr sz="2000" dirty="0">
+              <a:highlight>
+                <a:srgbClr val="FFFF00"/>
+              </a:highlight>
+            </a:endParaRPr>
           </a:p>
           <a:p>
             <a:pPr marL="1371600" lvl="2" indent="-355600" algn="l" rtl="0">
@@ -23353,10 +23450,26 @@
               <a:buAutoNum type="romanLcPeriod"/>
             </a:pPr>
             <a:r>
-              <a:rPr lang="en-US" sz="2000"/>
-              <a:t>AssignedTo -&gt; textbox</a:t>
+              <a:rPr lang="en-US" sz="2000" dirty="0" err="1">
+                <a:highlight>
+                  <a:srgbClr val="FFFF00"/>
+                </a:highlight>
+              </a:rPr>
+              <a:t>AssignedTo</a:t>
             </a:r>
-            <a:endParaRPr sz="2000"/>
+            <a:r>
+              <a:rPr lang="en-US" sz="2000" dirty="0">
+                <a:highlight>
+                  <a:srgbClr val="FFFF00"/>
+                </a:highlight>
+              </a:rPr>
+              <a:t> -&gt; textbox</a:t>
+            </a:r>
+            <a:endParaRPr sz="2000" dirty="0">
+              <a:highlight>
+                <a:srgbClr val="FFFF00"/>
+              </a:highlight>
+            </a:endParaRPr>
           </a:p>
           <a:p>
             <a:pPr marL="1371600" lvl="2" indent="-355600" algn="l" rtl="0">
@@ -23373,10 +23486,58 @@
               <a:buAutoNum type="romanLcPeriod"/>
             </a:pPr>
             <a:r>
-              <a:rPr lang="en-US" sz="2000"/>
-              <a:t>DueDate -&gt; textbox or datepicker [dd/mm/yyyy]</a:t>
+              <a:rPr lang="en-US" sz="2000" dirty="0" err="1">
+                <a:highlight>
+                  <a:srgbClr val="FFFF00"/>
+                </a:highlight>
+              </a:rPr>
+              <a:t>DueDate</a:t>
             </a:r>
-            <a:endParaRPr sz="2000"/>
+            <a:r>
+              <a:rPr lang="en-US" sz="2000" dirty="0">
+                <a:highlight>
+                  <a:srgbClr val="FFFF00"/>
+                </a:highlight>
+              </a:rPr>
+              <a:t> -&gt; textbox or </a:t>
+            </a:r>
+            <a:r>
+              <a:rPr lang="en-US" sz="2000" dirty="0" err="1">
+                <a:highlight>
+                  <a:srgbClr val="FFFF00"/>
+                </a:highlight>
+              </a:rPr>
+              <a:t>datepicker</a:t>
+            </a:r>
+            <a:r>
+              <a:rPr lang="en-US" sz="2000" dirty="0">
+                <a:highlight>
+                  <a:srgbClr val="FFFF00"/>
+                </a:highlight>
+              </a:rPr>
+              <a:t> [dd/mm/</a:t>
+            </a:r>
+            <a:r>
+              <a:rPr lang="en-US" sz="2000" dirty="0" err="1">
+                <a:highlight>
+                  <a:srgbClr val="FFFF00"/>
+                </a:highlight>
+              </a:rPr>
+              <a:t>yyyy</a:t>
+            </a:r>
+            <a:r>
+              <a:rPr lang="en-US" sz="2000" dirty="0">
+                <a:highlight>
+                  <a:srgbClr val="FFFF00"/>
+                </a:highlight>
+              </a:rPr>
+              <a:t>]</a:t>
+            </a:r>
+            <a:endParaRPr sz="2000" dirty="0">
+              <a:highlight>
+                <a:srgbClr val="FFFF00"/>
+              </a:highlight>
+            </a:endParaRPr>
           </a:p>
           <a:p>
             <a:pPr marL="1371600" lvl="2" indent="-355600" algn="l" rtl="0">
@@ -23393,10 +23554,18 @@
               <a:buAutoNum type="romanLcPeriod"/>
             </a:pPr>
             <a:r>
-              <a:rPr lang="en-US" sz="2000"/>
+              <a:rPr lang="en-US" sz="2000" dirty="0">
+                <a:highlight>
+                  <a:srgbClr val="FFFF00"/>
+                </a:highlight>
+              </a:rPr>
               <a:t>Status -&gt; Dropdown select box [TODO, IN PROGRESS, REVIEW, DONE]</a:t>
             </a:r>
-            <a:endParaRPr sz="2000"/>
+            <a:endParaRPr sz="2000" dirty="0">
+              <a:highlight>
+                <a:srgbClr val="FFFF00"/>
+              </a:highlight>
+            </a:endParaRPr>
           </a:p>
           <a:p>
             <a:pPr marL="1371600" lvl="2" indent="-355600" algn="l" rtl="0">
@@ -23413,10 +23582,18 @@
               <a:buAutoNum type="romanLcPeriod"/>
             </a:pPr>
             <a:r>
-              <a:rPr lang="en-US" sz="2000"/>
+              <a:rPr lang="en-US" sz="2000" dirty="0">
+                <a:highlight>
+                  <a:srgbClr val="FFFF00"/>
+                </a:highlight>
+              </a:rPr>
               <a:t>Submit button</a:t>
             </a:r>
-            <a:endParaRPr sz="2000"/>
+            <a:endParaRPr sz="2000" dirty="0">
+              <a:highlight>
+                <a:srgbClr val="FFFF00"/>
+              </a:highlight>
+            </a:endParaRPr>
           </a:p>
           <a:p>
             <a:pPr marL="1371600" lvl="2" indent="-355600" algn="l" rtl="0">
@@ -23433,10 +23610,18 @@
               <a:buAutoNum type="romanLcPeriod"/>
             </a:pPr>
             <a:r>
-              <a:rPr lang="en-US" sz="2000"/>
+              <a:rPr lang="en-US" sz="2000" dirty="0">
+                <a:highlight>
+                  <a:srgbClr val="FFFF00"/>
+                </a:highlight>
+              </a:rPr>
               <a:t>Reset button</a:t>
             </a:r>
-            <a:endParaRPr sz="2000"/>
+            <a:endParaRPr sz="2000" dirty="0">
+              <a:highlight>
+                <a:srgbClr val="FFFF00"/>
+              </a:highlight>
+            </a:endParaRPr>
           </a:p>
           <a:p>
             <a:pPr marL="457200" lvl="0" indent="-387350" algn="l" rtl="0">
@@ -23453,10 +23638,18 @@
               <a:buChar char="▪"/>
             </a:pPr>
             <a:r>
-              <a:rPr lang="en-US" sz="2500"/>
+              <a:rPr lang="en-US" sz="2500" dirty="0">
+                <a:highlight>
+                  <a:srgbClr val="FFFF00"/>
+                </a:highlight>
+              </a:rPr>
               <a:t>Use appropriate names/ids for labels and input boxes</a:t>
             </a:r>
-            <a:endParaRPr sz="2500"/>
+            <a:endParaRPr sz="2500" dirty="0">
+              <a:highlight>
+                <a:srgbClr val="FFFF00"/>
+              </a:highlight>
+            </a:endParaRPr>
           </a:p>
         </p:txBody>
       </p:sp>
@@ -23675,6 +23868,9 @@
             </a:pPr>
             <a:r>
               <a:rPr lang="en-US" sz="2000" dirty="0">
+                <a:highlight>
+                  <a:srgbClr val="FFFF00"/>
+                </a:highlight>
                 <a:latin typeface="Arial"/>
                 <a:ea typeface="Arial"/>
                 <a:cs typeface="Arial"/>
@@ -23683,6 +23879,9 @@
               <a:t>Get familiar with Bootstrap Task card layout and List Groups</a:t>
             </a:r>
             <a:endParaRPr sz="2000" dirty="0">
+              <a:highlight>
+                <a:srgbClr val="FFFF00"/>
+              </a:highlight>
               <a:latin typeface="Arial"/>
               <a:ea typeface="Arial"/>
               <a:cs typeface="Arial"/>
@@ -23709,6 +23908,9 @@
             </a:pPr>
             <a:r>
               <a:rPr lang="en-US" sz="2000" dirty="0">
+                <a:highlight>
+                  <a:srgbClr val="FFFF00"/>
+                </a:highlight>
                 <a:latin typeface="Arial"/>
                 <a:ea typeface="Arial"/>
                 <a:cs typeface="Arial"/>
@@ -23716,11 +23918,52 @@
               </a:rPr>
               <a:t>Create a Task card layout</a:t>
             </a:r>
-            <a:endParaRPr sz="2000" dirty="0">
-              <a:latin typeface="Arial"/>
-              <a:ea typeface="Arial"/>
-              <a:cs typeface="Arial"/>
-              <a:sym typeface="Arial"/>
+          </a:p>
+          <a:p>
+            <a:pPr marL="457200" lvl="0" indent="-387350" algn="l" rtl="0">
+              <a:lnSpc>
+                <a:spcPct val="115000"/>
+              </a:lnSpc>
+              <a:spcBef>
+                <a:spcPts val="0"/>
+              </a:spcBef>
+              <a:spcAft>
+                <a:spcPts val="0"/>
+              </a:spcAft>
+              <a:buSzPts val="2500"/>
+              <a:buChar char="▪"/>
+            </a:pPr>
+            <a:r>
+              <a:rPr lang="en-US" sz="2500" dirty="0">
+                <a:highlight>
+                  <a:srgbClr val="FFFF00"/>
+                </a:highlight>
+              </a:rPr>
+              <a:t>In your index.html file, create a card layout in HTML and Bootstrap that represents a task card</a:t>
+            </a:r>
+            <a:r>
+              <a:rPr lang="en-US" sz="2500" dirty="0"/>
+              <a:t>. </a:t>
+            </a:r>
+            <a:r>
+              <a:rPr lang="en-US" sz="2500" dirty="0">
+                <a:highlight>
+                  <a:srgbClr val="FF0000"/>
+                </a:highlight>
+              </a:rPr>
+              <a:t>You can also use list groups to list the tasks with a div slide down element that displays the details of the task.</a:t>
+            </a:r>
+            <a:br>
+              <a:rPr lang="en-US" sz="2500" dirty="0">
+                <a:highlight>
+                  <a:srgbClr val="FF0000"/>
+                </a:highlight>
+              </a:rPr>
+            </a:br>
+            <a:endParaRPr lang="en-US" sz="2500" dirty="0">
+              <a:highlight>
+                <a:srgbClr val="FF0000"/>
+              </a:highlight>
             </a:endParaRPr>
           </a:p>
           <a:p>
@@ -23738,41 +23981,29 @@
               <a:buChar char="▪"/>
             </a:pPr>
             <a:r>
-              <a:rPr lang="en-US" sz="2500" dirty="0"/>
-              <a:t>In your index.html file, create a card layout in HTML and Bootstrap that represents a task card. You can also use list groups to list the tasks with a div slide down element that displays the details of the task.</a:t>
-            </a:r>
-            <a:br>
-              <a:rPr lang="en-US" sz="2500" dirty="0"/>
-            </a:br>
-            <a:endParaRPr sz="2500" dirty="0"/>
-          </a:p>
-          <a:p>
-            <a:pPr marL="457200" lvl="0" indent="-387350" algn="l" rtl="0">
-              <a:lnSpc>
-                <a:spcPct val="115000"/>
-              </a:lnSpc>
-              <a:spcBef>
-                <a:spcPts val="0"/>
-              </a:spcBef>
-              <a:spcAft>
-                <a:spcPts val="0"/>
-              </a:spcAft>
-              <a:buSzPts val="2500"/>
-              <a:buChar char="▪"/>
-            </a:pPr>
-            <a:r>
-              <a:rPr lang="en-US" sz="2500" dirty="0"/>
+              <a:rPr lang="en-US" sz="2500" dirty="0">
+                <a:highlight>
+                  <a:srgbClr val="FFFF00"/>
+                </a:highlight>
+              </a:rPr>
               <a:t>Each card should display all details of the task including, task name, description, assignee, date and status.</a:t>
             </a:r>
             <a:br>
               <a:rPr lang="en-US" sz="2500" dirty="0">
+                <a:highlight>
+                  <a:srgbClr val="FFFF00"/>
+                </a:highlight>
                 <a:latin typeface="Arial"/>
                 <a:ea typeface="Arial"/>
                 <a:cs typeface="Arial"/>
                 <a:sym typeface="Arial"/>
               </a:rPr>
             </a:br>
-            <a:endParaRPr sz="2500" dirty="0"/>
+            <a:endParaRPr sz="2500" dirty="0">
+              <a:highlight>
+                <a:srgbClr val="FFFF00"/>
+              </a:highlight>
+            </a:endParaRPr>
           </a:p>
         </p:txBody>
       </p:sp>
@@ -23984,7 +24215,7 @@
               </a:spcAft>
               <a:buNone/>
             </a:pPr>
-            <a:endParaRPr sz="2000"/>
+            <a:endParaRPr sz="2000" dirty="0"/>
           </a:p>
           <a:p>
             <a:pPr marL="457200" lvl="0" indent="-387350" algn="l" rtl="0">
@@ -24001,13 +24232,25 @@
               <a:buChar char="▪"/>
             </a:pPr>
             <a:r>
-              <a:rPr lang="en-US" sz="2500"/>
+              <a:rPr lang="en-US" sz="2500" dirty="0">
+                <a:highlight>
+                  <a:srgbClr val="FFFF00"/>
+                </a:highlight>
+              </a:rPr>
               <a:t>Each task should also have an Edit button and Delete button. The edit button should link to open up the "Edit form" modal (Similar to the Add modal created in Step 1). The delete button deletes the task (This will be coded later in the project)</a:t>
             </a:r>
             <a:br>
-              <a:rPr lang="en-US" sz="2500"/>
+              <a:rPr lang="en-US" sz="2500" dirty="0">
+                <a:highlight>
+                  <a:srgbClr val="FFFF00"/>
+                </a:highlight>
+              </a:rPr>
             </a:br>
-            <a:endParaRPr sz="2500"/>
+            <a:endParaRPr sz="2500" dirty="0">
+              <a:highlight>
+                <a:srgbClr val="FFFF00"/>
+              </a:highlight>
+            </a:endParaRPr>
           </a:p>
           <a:p>
             <a:pPr marL="457200" lvl="0" indent="-387350" algn="l" rtl="0">
@@ -24024,13 +24267,17 @@
               <a:buChar char="▪"/>
             </a:pPr>
             <a:r>
-              <a:rPr lang="en-US" sz="2500"/>
+              <a:rPr lang="en-US" sz="2500" dirty="0">
+                <a:highlight>
+                  <a:srgbClr val="FFFF00"/>
+                </a:highlight>
+              </a:rPr>
               <a:t>A button named "Add New Task" should open up the Task form</a:t>
             </a:r>
             <a:br>
-              <a:rPr lang="en-US" sz="2500"/>
+              <a:rPr lang="en-US" sz="2500" dirty="0"/>
             </a:br>
-            <a:endParaRPr sz="2500"/>
+            <a:endParaRPr sz="2500" dirty="0"/>
           </a:p>
         </p:txBody>
       </p:sp>

</xml_diff>